<commit_message>
added report submission and feature importance in presentation
</commit_message>
<xml_diff>
--- a/Presentation.pptx
+++ b/Presentation.pptx
@@ -5,7 +5,7 @@
     <p:sldMasterId id="2147483660" r:id="rId1"/>
   </p:sldMasterIdLst>
   <p:notesMasterIdLst>
-    <p:notesMasterId r:id="rId11"/>
+    <p:notesMasterId r:id="rId12"/>
   </p:notesMasterIdLst>
   <p:sldIdLst>
     <p:sldId id="256" r:id="rId2"/>
@@ -15,8 +15,9 @@
     <p:sldId id="261" r:id="rId6"/>
     <p:sldId id="267" r:id="rId7"/>
     <p:sldId id="262" r:id="rId8"/>
-    <p:sldId id="263" r:id="rId9"/>
-    <p:sldId id="264" r:id="rId10"/>
+    <p:sldId id="268" r:id="rId9"/>
+    <p:sldId id="263" r:id="rId10"/>
+    <p:sldId id="264" r:id="rId11"/>
   </p:sldIdLst>
   <p:sldSz cx="12192000" cy="6858000"/>
   <p:notesSz cx="6858000" cy="9144000"/>
@@ -613,6 +614,90 @@
 </p:notes>
 </file>
 
+<file path=ppt/notesSlides/notesSlide10.xml><?xml version="1.0" encoding="utf-8"?>
+<p:notes xmlns:a="http://schemas.openxmlformats.org/drawingml/2006/main" xmlns:r="http://schemas.openxmlformats.org/officeDocument/2006/relationships" xmlns:p="http://schemas.openxmlformats.org/presentationml/2006/main">
+  <p:cSld>
+    <p:spTree>
+      <p:nvGrpSpPr>
+        <p:cNvPr id="1" name=""/>
+        <p:cNvGrpSpPr/>
+        <p:nvPr/>
+      </p:nvGrpSpPr>
+      <p:grpSpPr>
+        <a:xfrm>
+          <a:off x="0" y="0"/>
+          <a:ext cx="0" cy="0"/>
+          <a:chOff x="0" y="0"/>
+          <a:chExt cx="0" cy="0"/>
+        </a:xfrm>
+      </p:grpSpPr>
+      <p:sp>
+        <p:nvSpPr>
+          <p:cNvPr id="2" name="Slide Image Placeholder 1"/>
+          <p:cNvSpPr>
+            <a:spLocks noGrp="1" noRot="1" noChangeAspect="1"/>
+          </p:cNvSpPr>
+          <p:nvPr>
+            <p:ph type="sldImg"/>
+          </p:nvPr>
+        </p:nvSpPr>
+        <p:spPr/>
+      </p:sp>
+      <p:sp>
+        <p:nvSpPr>
+          <p:cNvPr id="3" name="Notes Placeholder 2"/>
+          <p:cNvSpPr>
+            <a:spLocks noGrp="1"/>
+          </p:cNvSpPr>
+          <p:nvPr>
+            <p:ph type="body" idx="1"/>
+          </p:nvPr>
+        </p:nvSpPr>
+        <p:spPr/>
+        <p:txBody>
+          <a:bodyPr/>
+          <a:lstStyle/>
+          <a:p>
+            <a:endParaRPr lang="en-GB" dirty="0"/>
+          </a:p>
+        </p:txBody>
+      </p:sp>
+      <p:sp>
+        <p:nvSpPr>
+          <p:cNvPr id="4" name="Slide Number Placeholder 3"/>
+          <p:cNvSpPr>
+            <a:spLocks noGrp="1"/>
+          </p:cNvSpPr>
+          <p:nvPr>
+            <p:ph type="sldNum" sz="quarter" idx="10"/>
+          </p:nvPr>
+        </p:nvSpPr>
+        <p:spPr/>
+        <p:txBody>
+          <a:bodyPr/>
+          <a:lstStyle/>
+          <a:p>
+            <a:fld id="{DD801837-D9B4-4140-8B18-11EA6BF1B100}" type="slidenum">
+              <a:rPr lang="en-GB" smtClean="0"/>
+              <a:t>10</a:t>
+            </a:fld>
+            <a:endParaRPr lang="en-GB"/>
+          </a:p>
+        </p:txBody>
+      </p:sp>
+    </p:spTree>
+    <p:extLst>
+      <p:ext uri="{BB962C8B-B14F-4D97-AF65-F5344CB8AC3E}">
+        <p14:creationId xmlns:p14="http://schemas.microsoft.com/office/powerpoint/2010/main" val="496418837"/>
+      </p:ext>
+    </p:extLst>
+  </p:cSld>
+  <p:clrMapOvr>
+    <a:masterClrMapping/>
+  </p:clrMapOvr>
+</p:notes>
+</file>
+
 <file path=ppt/notesSlides/notesSlide2.xml><?xml version="1.0" encoding="utf-8"?>
 <p:notes xmlns:a="http://schemas.openxmlformats.org/drawingml/2006/main" xmlns:r="http://schemas.openxmlformats.org/officeDocument/2006/relationships" xmlns:p="http://schemas.openxmlformats.org/presentationml/2006/main">
   <p:cSld>
@@ -1691,7 +1776,10 @@
           <a:bodyPr/>
           <a:lstStyle/>
           <a:p>
-            <a:endParaRPr lang="en-GB" dirty="0"/>
+            <a:r>
+              <a:rPr lang="en-GB" dirty="0"/>
+              <a:t> </a:t>
+            </a:r>
           </a:p>
         </p:txBody>
       </p:sp>
@@ -1721,7 +1809,7 @@
     </p:spTree>
     <p:extLst>
       <p:ext uri="{BB962C8B-B14F-4D97-AF65-F5344CB8AC3E}">
-        <p14:creationId xmlns:p14="http://schemas.microsoft.com/office/powerpoint/2010/main" val="446436855"/>
+        <p14:creationId xmlns:p14="http://schemas.microsoft.com/office/powerpoint/2010/main" val="913463290"/>
       </p:ext>
     </p:extLst>
   </p:cSld>
@@ -1805,7 +1893,7 @@
     </p:spTree>
     <p:extLst>
       <p:ext uri="{BB962C8B-B14F-4D97-AF65-F5344CB8AC3E}">
-        <p14:creationId xmlns:p14="http://schemas.microsoft.com/office/powerpoint/2010/main" val="496418837"/>
+        <p14:creationId xmlns:p14="http://schemas.microsoft.com/office/powerpoint/2010/main" val="446436855"/>
       </p:ext>
     </p:extLst>
   </p:cSld>
@@ -2028,7 +2116,7 @@
           <a:p>
             <a:fld id="{BDDAFA7A-6445-4002-8C74-4055B96B083F}" type="datetimeFigureOut">
               <a:rPr lang="en-US" smtClean="0"/>
-              <a:t>06-May-16</a:t>
+              <a:t>5/6/2016</a:t>
             </a:fld>
             <a:endParaRPr lang="en-US"/>
           </a:p>
@@ -2319,7 +2407,7 @@
           <a:p>
             <a:fld id="{BDDAFA7A-6445-4002-8C74-4055B96B083F}" type="datetimeFigureOut">
               <a:rPr lang="en-US" smtClean="0"/>
-              <a:t>06-May-16</a:t>
+              <a:t>5/6/2016</a:t>
             </a:fld>
             <a:endParaRPr lang="en-US"/>
           </a:p>
@@ -2578,7 +2666,7 @@
           <a:p>
             <a:fld id="{BDDAFA7A-6445-4002-8C74-4055B96B083F}" type="datetimeFigureOut">
               <a:rPr lang="en-US" smtClean="0"/>
-              <a:t>06-May-16</a:t>
+              <a:t>5/6/2016</a:t>
             </a:fld>
             <a:endParaRPr lang="en-US"/>
           </a:p>
@@ -3047,7 +3135,7 @@
           <a:p>
             <a:fld id="{BDDAFA7A-6445-4002-8C74-4055B96B083F}" type="datetimeFigureOut">
               <a:rPr lang="en-US" smtClean="0"/>
-              <a:t>06-May-16</a:t>
+              <a:t>5/6/2016</a:t>
             </a:fld>
             <a:endParaRPr lang="en-US"/>
           </a:p>
@@ -3227,7 +3315,7 @@
           <a:p>
             <a:fld id="{BDDAFA7A-6445-4002-8C74-4055B96B083F}" type="datetimeFigureOut">
               <a:rPr lang="en-US" smtClean="0"/>
-              <a:t>06-May-16</a:t>
+              <a:t>5/6/2016</a:t>
             </a:fld>
             <a:endParaRPr lang="en-US"/>
           </a:p>
@@ -3803,7 +3891,7 @@
           <a:p>
             <a:fld id="{BDDAFA7A-6445-4002-8C74-4055B96B083F}" type="datetimeFigureOut">
               <a:rPr lang="en-US" smtClean="0"/>
-              <a:t>06-May-16</a:t>
+              <a:t>5/6/2016</a:t>
             </a:fld>
             <a:endParaRPr lang="en-US"/>
           </a:p>
@@ -4135,7 +4223,7 @@
           <a:p>
             <a:fld id="{BDDAFA7A-6445-4002-8C74-4055B96B083F}" type="datetimeFigureOut">
               <a:rPr lang="en-US" smtClean="0"/>
-              <a:t>06-May-16</a:t>
+              <a:t>5/6/2016</a:t>
             </a:fld>
             <a:endParaRPr lang="en-US"/>
           </a:p>
@@ -4310,7 +4398,7 @@
           <a:p>
             <a:fld id="{BDDAFA7A-6445-4002-8C74-4055B96B083F}" type="datetimeFigureOut">
               <a:rPr lang="en-US" smtClean="0"/>
-              <a:t>06-May-16</a:t>
+              <a:t>5/6/2016</a:t>
             </a:fld>
             <a:endParaRPr lang="en-US"/>
           </a:p>
@@ -4490,7 +4578,7 @@
           <a:p>
             <a:fld id="{BDDAFA7A-6445-4002-8C74-4055B96B083F}" type="datetimeFigureOut">
               <a:rPr lang="en-US" smtClean="0"/>
-              <a:t>06-May-16</a:t>
+              <a:t>5/6/2016</a:t>
             </a:fld>
             <a:endParaRPr lang="en-US"/>
           </a:p>
@@ -4670,7 +4758,7 @@
           <a:p>
             <a:fld id="{BDDAFA7A-6445-4002-8C74-4055B96B083F}" type="datetimeFigureOut">
               <a:rPr lang="en-US" smtClean="0"/>
-              <a:t>06-May-16</a:t>
+              <a:t>5/6/2016</a:t>
             </a:fld>
             <a:endParaRPr lang="en-US"/>
           </a:p>
@@ -4927,7 +5015,7 @@
           <a:p>
             <a:fld id="{BDDAFA7A-6445-4002-8C74-4055B96B083F}" type="datetimeFigureOut">
               <a:rPr lang="en-US" smtClean="0"/>
-              <a:t>06-May-16</a:t>
+              <a:t>5/6/2016</a:t>
             </a:fld>
             <a:endParaRPr lang="en-US"/>
           </a:p>
@@ -5219,7 +5307,7 @@
           <a:p>
             <a:fld id="{BDDAFA7A-6445-4002-8C74-4055B96B083F}" type="datetimeFigureOut">
               <a:rPr lang="en-US" smtClean="0"/>
-              <a:t>06-May-16</a:t>
+              <a:t>5/6/2016</a:t>
             </a:fld>
             <a:endParaRPr lang="en-US"/>
           </a:p>
@@ -5649,7 +5737,7 @@
           <a:p>
             <a:fld id="{BDDAFA7A-6445-4002-8C74-4055B96B083F}" type="datetimeFigureOut">
               <a:rPr lang="en-US" smtClean="0"/>
-              <a:t>06-May-16</a:t>
+              <a:t>5/6/2016</a:t>
             </a:fld>
             <a:endParaRPr lang="en-US"/>
           </a:p>
@@ -5767,7 +5855,7 @@
           <a:p>
             <a:fld id="{BDDAFA7A-6445-4002-8C74-4055B96B083F}" type="datetimeFigureOut">
               <a:rPr lang="en-US" smtClean="0"/>
-              <a:t>06-May-16</a:t>
+              <a:t>5/6/2016</a:t>
             </a:fld>
             <a:endParaRPr lang="en-US"/>
           </a:p>
@@ -5862,7 +5950,7 @@
           <a:p>
             <a:fld id="{BDDAFA7A-6445-4002-8C74-4055B96B083F}" type="datetimeFigureOut">
               <a:rPr lang="en-US" smtClean="0"/>
-              <a:t>06-May-16</a:t>
+              <a:t>5/6/2016</a:t>
             </a:fld>
             <a:endParaRPr lang="en-US"/>
           </a:p>
@@ -6145,7 +6233,7 @@
           <a:p>
             <a:fld id="{BDDAFA7A-6445-4002-8C74-4055B96B083F}" type="datetimeFigureOut">
               <a:rPr lang="en-US" smtClean="0"/>
-              <a:t>06-May-16</a:t>
+              <a:t>5/6/2016</a:t>
             </a:fld>
             <a:endParaRPr lang="en-US"/>
           </a:p>
@@ -6436,7 +6524,7 @@
           <a:p>
             <a:fld id="{BDDAFA7A-6445-4002-8C74-4055B96B083F}" type="datetimeFigureOut">
               <a:rPr lang="en-US" smtClean="0"/>
-              <a:t>06-May-16</a:t>
+              <a:t>5/6/2016</a:t>
             </a:fld>
             <a:endParaRPr lang="en-US"/>
           </a:p>
@@ -6667,7 +6755,7 @@
           <a:p>
             <a:fld id="{BDDAFA7A-6445-4002-8C74-4055B96B083F}" type="datetimeFigureOut">
               <a:rPr lang="en-US" smtClean="0"/>
-              <a:t>06-May-16</a:t>
+              <a:t>5/6/2016</a:t>
             </a:fld>
             <a:endParaRPr lang="en-US"/>
           </a:p>
@@ -7473,6 +7561,10 @@
           </a:bodyPr>
           <a:lstStyle/>
           <a:p>
+            <a:r>
+              <a:rPr lang="en-US" sz="6000" b="1" dirty="0"/>
+              <a:t/>
+            </a:r>
             <a:br>
               <a:rPr lang="en-US" sz="6000" b="1" dirty="0"/>
             </a:br>
@@ -7649,6 +7741,150 @@
   <p:clrMapOvr>
     <a:masterClrMapping/>
   </p:clrMapOvr>
+</p:sld>
+</file>
+
+<file path=ppt/slides/slide10.xml><?xml version="1.0" encoding="utf-8"?>
+<p:sld xmlns:a="http://schemas.openxmlformats.org/drawingml/2006/main" xmlns:r="http://schemas.openxmlformats.org/officeDocument/2006/relationships" xmlns:p="http://schemas.openxmlformats.org/presentationml/2006/main">
+  <p:cSld>
+    <p:bg>
+      <p:bgPr>
+        <a:pattFill prst="pct50">
+          <a:fgClr>
+            <a:schemeClr val="tx1"/>
+          </a:fgClr>
+          <a:bgClr>
+            <a:schemeClr val="tx1">
+              <a:lumMod val="95000"/>
+            </a:schemeClr>
+          </a:bgClr>
+        </a:pattFill>
+        <a:effectLst/>
+      </p:bgPr>
+    </p:bg>
+    <p:spTree>
+      <p:nvGrpSpPr>
+        <p:cNvPr id="1" name=""/>
+        <p:cNvGrpSpPr/>
+        <p:nvPr/>
+      </p:nvGrpSpPr>
+      <p:grpSpPr>
+        <a:xfrm>
+          <a:off x="0" y="0"/>
+          <a:ext cx="0" cy="0"/>
+          <a:chOff x="0" y="0"/>
+          <a:chExt cx="0" cy="0"/>
+        </a:xfrm>
+      </p:grpSpPr>
+      <p:sp>
+        <p:nvSpPr>
+          <p:cNvPr id="2" name="Title 1"/>
+          <p:cNvSpPr>
+            <a:spLocks noGrp="1"/>
+          </p:cNvSpPr>
+          <p:nvPr>
+            <p:ph type="title"/>
+          </p:nvPr>
+        </p:nvSpPr>
+        <p:spPr/>
+        <p:txBody>
+          <a:bodyPr>
+            <a:normAutofit/>
+          </a:bodyPr>
+          <a:lstStyle/>
+          <a:p>
+            <a:r>
+              <a:rPr lang="en-US" sz="3600" b="1" dirty="0">
+                <a:solidFill>
+                  <a:schemeClr val="bg1"/>
+                </a:solidFill>
+              </a:rPr>
+              <a:t>conclusion</a:t>
+            </a:r>
+          </a:p>
+        </p:txBody>
+      </p:sp>
+      <p:sp>
+        <p:nvSpPr>
+          <p:cNvPr id="3" name="Content Placeholder 2"/>
+          <p:cNvSpPr>
+            <a:spLocks noGrp="1"/>
+          </p:cNvSpPr>
+          <p:nvPr>
+            <p:ph idx="1"/>
+          </p:nvPr>
+        </p:nvSpPr>
+        <p:spPr/>
+        <p:txBody>
+          <a:bodyPr>
+            <a:normAutofit/>
+          </a:bodyPr>
+          <a:lstStyle/>
+          <a:p>
+            <a:endParaRPr lang="en-US" sz="3200" dirty="0">
+              <a:solidFill>
+                <a:schemeClr val="bg1"/>
+              </a:solidFill>
+            </a:endParaRPr>
+          </a:p>
+          <a:p>
+            <a:r>
+              <a:rPr lang="en-US" sz="3200" dirty="0" smtClean="0">
+                <a:solidFill>
+                  <a:schemeClr val="bg1"/>
+                </a:solidFill>
+              </a:rPr>
+              <a:t>Noisy dataset</a:t>
+            </a:r>
+          </a:p>
+          <a:p>
+            <a:r>
+              <a:rPr lang="en-US" sz="3200" dirty="0" smtClean="0">
+                <a:solidFill>
+                  <a:schemeClr val="bg1"/>
+                </a:solidFill>
+              </a:rPr>
+              <a:t>Models prone to overfitting</a:t>
+            </a:r>
+          </a:p>
+          <a:p>
+            <a:r>
+              <a:rPr lang="en-US" sz="3200" dirty="0" smtClean="0">
+                <a:solidFill>
+                  <a:schemeClr val="bg1"/>
+                </a:solidFill>
+              </a:rPr>
+              <a:t>Preprocessing and </a:t>
+            </a:r>
+            <a:r>
+              <a:rPr lang="en-US" sz="3200" dirty="0" smtClean="0">
+                <a:solidFill>
+                  <a:schemeClr val="bg1"/>
+                </a:solidFill>
+              </a:rPr>
+              <a:t>feature extraction key to success</a:t>
+            </a:r>
+            <a:endParaRPr lang="en-US" sz="3200" dirty="0"/>
+          </a:p>
+        </p:txBody>
+      </p:sp>
+    </p:spTree>
+    <p:extLst>
+      <p:ext uri="{BB962C8B-B14F-4D97-AF65-F5344CB8AC3E}">
+        <p14:creationId xmlns:p14="http://schemas.microsoft.com/office/powerpoint/2010/main" val="1678848181"/>
+      </p:ext>
+    </p:extLst>
+  </p:cSld>
+  <p:clrMapOvr>
+    <a:masterClrMapping/>
+  </p:clrMapOvr>
+  <p:timing>
+    <p:tnLst>
+      <p:par>
+        <p:cTn id="1" dur="indefinite" restart="never" nodeType="tmRoot"/>
+      </p:par>
+    </p:tnLst>
+  </p:timing>
 </p:sld>
 </file>
 
@@ -8637,6 +8873,114 @@
           <a:chExt cx="0" cy="0"/>
         </a:xfrm>
       </p:grpSpPr>
+      <p:pic>
+        <p:nvPicPr>
+          <p:cNvPr id="5" name="Content Placeholder 4"/>
+          <p:cNvPicPr>
+            <a:picLocks noGrp="1" noChangeAspect="1"/>
+          </p:cNvPicPr>
+          <p:nvPr>
+            <p:ph idx="1"/>
+          </p:nvPr>
+        </p:nvPicPr>
+        <p:blipFill>
+          <a:blip r:embed="rId3" cstate="print">
+            <a:extLst>
+              <a:ext uri="{28A0092B-C50C-407E-A947-70E740481C1C}">
+                <a14:useLocalDpi xmlns:a14="http://schemas.microsoft.com/office/drawing/2010/main" val="0"/>
+              </a:ext>
+            </a:extLst>
+          </a:blip>
+          <a:stretch>
+            <a:fillRect/>
+          </a:stretch>
+        </p:blipFill>
+        <p:spPr>
+          <a:xfrm>
+            <a:off x="880837" y="1390265"/>
+            <a:ext cx="10427147" cy="5467735"/>
+          </a:xfrm>
+        </p:spPr>
+      </p:pic>
+      <p:sp>
+        <p:nvSpPr>
+          <p:cNvPr id="4" name="Title 3"/>
+          <p:cNvSpPr>
+            <a:spLocks noGrp="1"/>
+          </p:cNvSpPr>
+          <p:nvPr>
+            <p:ph type="title"/>
+          </p:nvPr>
+        </p:nvSpPr>
+        <p:spPr/>
+        <p:txBody>
+          <a:bodyPr>
+            <a:normAutofit/>
+          </a:bodyPr>
+          <a:lstStyle/>
+          <a:p>
+            <a:pPr algn="ctr"/>
+            <a:r>
+              <a:rPr lang="en-US" sz="3600" b="1" dirty="0" smtClean="0">
+                <a:solidFill>
+                  <a:schemeClr val="bg1"/>
+                </a:solidFill>
+              </a:rPr>
+              <a:t>FEATURE IMPORTANCE</a:t>
+            </a:r>
+            <a:endParaRPr lang="en-GB" sz="3600" b="1" dirty="0">
+              <a:solidFill>
+                <a:schemeClr val="bg1"/>
+              </a:solidFill>
+            </a:endParaRPr>
+          </a:p>
+        </p:txBody>
+      </p:sp>
+    </p:spTree>
+    <p:extLst>
+      <p:ext uri="{BB962C8B-B14F-4D97-AF65-F5344CB8AC3E}">
+        <p14:creationId xmlns:p14="http://schemas.microsoft.com/office/powerpoint/2010/main" val="3790333308"/>
+      </p:ext>
+    </p:extLst>
+  </p:cSld>
+  <p:clrMapOvr>
+    <a:masterClrMapping/>
+  </p:clrMapOvr>
+</p:sld>
+</file>
+
+<file path=ppt/slides/slide9.xml><?xml version="1.0" encoding="utf-8"?>
+<p:sld xmlns:a="http://schemas.openxmlformats.org/drawingml/2006/main" xmlns:r="http://schemas.openxmlformats.org/officeDocument/2006/relationships" xmlns:p="http://schemas.openxmlformats.org/presentationml/2006/main">
+  <p:cSld>
+    <p:bg>
+      <p:bgPr>
+        <a:pattFill prst="pct50">
+          <a:fgClr>
+            <a:schemeClr val="tx1"/>
+          </a:fgClr>
+          <a:bgClr>
+            <a:schemeClr val="tx1">
+              <a:lumMod val="95000"/>
+            </a:schemeClr>
+          </a:bgClr>
+        </a:pattFill>
+        <a:effectLst/>
+      </p:bgPr>
+    </p:bg>
+    <p:spTree>
+      <p:nvGrpSpPr>
+        <p:cNvPr id="1" name=""/>
+        <p:cNvGrpSpPr/>
+        <p:nvPr/>
+      </p:nvGrpSpPr>
+      <p:grpSpPr>
+        <a:xfrm>
+          <a:off x="0" y="0"/>
+          <a:ext cx="0" cy="0"/>
+          <a:chOff x="0" y="0"/>
+          <a:chExt cx="0" cy="0"/>
+        </a:xfrm>
+      </p:grpSpPr>
       <p:sp>
         <p:nvSpPr>
           <p:cNvPr id="2" name="Title 1"/>
@@ -8692,28 +9036,28 @@
                 <a:gridCol w="2650380">
                   <a:extLst>
                     <a:ext uri="{9D8B030D-6E8A-4147-A177-3AD203B41FA5}">
-                      <a16:colId xmlns:a16="http://schemas.microsoft.com/office/drawing/2014/main" val="20000"/>
+                      <a16:colId xmlns:a16="http://schemas.microsoft.com/office/drawing/2014/main" xmlns="" val="20000"/>
                     </a:ext>
                   </a:extLst>
                 </a:gridCol>
                 <a:gridCol w="2650380">
                   <a:extLst>
                     <a:ext uri="{9D8B030D-6E8A-4147-A177-3AD203B41FA5}">
-                      <a16:colId xmlns:a16="http://schemas.microsoft.com/office/drawing/2014/main" val="1446668731"/>
+                      <a16:colId xmlns:a16="http://schemas.microsoft.com/office/drawing/2014/main" xmlns="" val="1446668731"/>
                     </a:ext>
                   </a:extLst>
                 </a:gridCol>
                 <a:gridCol w="2650380">
                   <a:extLst>
                     <a:ext uri="{9D8B030D-6E8A-4147-A177-3AD203B41FA5}">
-                      <a16:colId xmlns:a16="http://schemas.microsoft.com/office/drawing/2014/main" val="3945954696"/>
+                      <a16:colId xmlns:a16="http://schemas.microsoft.com/office/drawing/2014/main" xmlns="" val="3945954696"/>
                     </a:ext>
                   </a:extLst>
                 </a:gridCol>
                 <a:gridCol w="3094755">
                   <a:extLst>
                     <a:ext uri="{9D8B030D-6E8A-4147-A177-3AD203B41FA5}">
-                      <a16:colId xmlns:a16="http://schemas.microsoft.com/office/drawing/2014/main" val="20001"/>
+                      <a16:colId xmlns:a16="http://schemas.microsoft.com/office/drawing/2014/main" xmlns="" val="20001"/>
                     </a:ext>
                   </a:extLst>
                 </a:gridCol>
@@ -8962,7 +9306,7 @@
                 </a:tc>
                 <a:extLst>
                   <a:ext uri="{0D108BD9-81ED-4DB2-BD59-A6C34878D82A}">
-                    <a16:rowId xmlns:a16="http://schemas.microsoft.com/office/drawing/2014/main" val="10000"/>
+                    <a16:rowId xmlns:a16="http://schemas.microsoft.com/office/drawing/2014/main" xmlns="" val="10000"/>
                   </a:ext>
                 </a:extLst>
               </a:tr>
@@ -9197,7 +9541,7 @@
                 </a:tc>
                 <a:extLst>
                   <a:ext uri="{0D108BD9-81ED-4DB2-BD59-A6C34878D82A}">
-                    <a16:rowId xmlns:a16="http://schemas.microsoft.com/office/drawing/2014/main" val="10001"/>
+                    <a16:rowId xmlns:a16="http://schemas.microsoft.com/office/drawing/2014/main" xmlns="" val="10001"/>
                   </a:ext>
                 </a:extLst>
               </a:tr>
@@ -9449,7 +9793,7 @@
                 </a:tc>
                 <a:extLst>
                   <a:ext uri="{0D108BD9-81ED-4DB2-BD59-A6C34878D82A}">
-                    <a16:rowId xmlns:a16="http://schemas.microsoft.com/office/drawing/2014/main" val="10002"/>
+                    <a16:rowId xmlns:a16="http://schemas.microsoft.com/office/drawing/2014/main" xmlns="" val="10002"/>
                   </a:ext>
                 </a:extLst>
               </a:tr>
@@ -9684,7 +10028,7 @@
                 </a:tc>
                 <a:extLst>
                   <a:ext uri="{0D108BD9-81ED-4DB2-BD59-A6C34878D82A}">
-                    <a16:rowId xmlns:a16="http://schemas.microsoft.com/office/drawing/2014/main" val="10003"/>
+                    <a16:rowId xmlns:a16="http://schemas.microsoft.com/office/drawing/2014/main" xmlns="" val="10003"/>
                   </a:ext>
                 </a:extLst>
               </a:tr>
@@ -9702,147 +10046,13 @@
   <p:clrMapOvr>
     <a:masterClrMapping/>
   </p:clrMapOvr>
-</p:sld>
-</file>
-
-<file path=ppt/slides/slide9.xml><?xml version="1.0" encoding="utf-8"?>
-<p:sld xmlns:a="http://schemas.openxmlformats.org/drawingml/2006/main" xmlns:r="http://schemas.openxmlformats.org/officeDocument/2006/relationships" xmlns:p="http://schemas.openxmlformats.org/presentationml/2006/main">
-  <p:cSld>
-    <p:bg>
-      <p:bgPr>
-        <a:pattFill prst="pct50">
-          <a:fgClr>
-            <a:schemeClr val="tx1"/>
-          </a:fgClr>
-          <a:bgClr>
-            <a:schemeClr val="tx1">
-              <a:lumMod val="95000"/>
-            </a:schemeClr>
-          </a:bgClr>
-        </a:pattFill>
-        <a:effectLst/>
-      </p:bgPr>
-    </p:bg>
-    <p:spTree>
-      <p:nvGrpSpPr>
-        <p:cNvPr id="1" name=""/>
-        <p:cNvGrpSpPr/>
-        <p:nvPr/>
-      </p:nvGrpSpPr>
-      <p:grpSpPr>
-        <a:xfrm>
-          <a:off x="0" y="0"/>
-          <a:ext cx="0" cy="0"/>
-          <a:chOff x="0" y="0"/>
-          <a:chExt cx="0" cy="0"/>
-        </a:xfrm>
-      </p:grpSpPr>
-      <p:sp>
-        <p:nvSpPr>
-          <p:cNvPr id="2" name="Title 1"/>
-          <p:cNvSpPr>
-            <a:spLocks noGrp="1"/>
-          </p:cNvSpPr>
-          <p:nvPr>
-            <p:ph type="title"/>
-          </p:nvPr>
-        </p:nvSpPr>
-        <p:spPr/>
-        <p:txBody>
-          <a:bodyPr>
-            <a:normAutofit/>
-          </a:bodyPr>
-          <a:lstStyle/>
-          <a:p>
-            <a:r>
-              <a:rPr lang="en-US" sz="3600" b="1" dirty="0">
-                <a:solidFill>
-                  <a:schemeClr val="bg1"/>
-                </a:solidFill>
-              </a:rPr>
-              <a:t>conclusion</a:t>
-            </a:r>
-          </a:p>
-        </p:txBody>
-      </p:sp>
-      <p:sp>
-        <p:nvSpPr>
-          <p:cNvPr id="3" name="Content Placeholder 2"/>
-          <p:cNvSpPr>
-            <a:spLocks noGrp="1"/>
-          </p:cNvSpPr>
-          <p:nvPr>
-            <p:ph idx="1"/>
-          </p:nvPr>
-        </p:nvSpPr>
-        <p:spPr/>
-        <p:txBody>
-          <a:bodyPr>
-            <a:normAutofit/>
-          </a:bodyPr>
-          <a:lstStyle/>
-          <a:p>
-            <a:endParaRPr lang="en-US" sz="2800" dirty="0">
-              <a:solidFill>
-                <a:schemeClr val="bg1"/>
-              </a:solidFill>
-            </a:endParaRPr>
-          </a:p>
-          <a:p>
-            <a:r>
-              <a:rPr lang="en-US" sz="2800" dirty="0">
-                <a:solidFill>
-                  <a:schemeClr val="bg1"/>
-                </a:solidFill>
-              </a:rPr>
-              <a:t>As the dataset was noisy, our model was prone to </a:t>
-            </a:r>
-            <a:r>
-              <a:rPr lang="en-US" sz="2800" dirty="0" err="1">
-                <a:solidFill>
-                  <a:schemeClr val="bg1"/>
-                </a:solidFill>
-              </a:rPr>
-              <a:t>overfit</a:t>
-            </a:r>
-            <a:endParaRPr lang="en-US" sz="2800" dirty="0">
-              <a:solidFill>
-                <a:schemeClr val="bg1"/>
-              </a:solidFill>
-            </a:endParaRPr>
-          </a:p>
-          <a:p>
-            <a:r>
-              <a:rPr lang="en-US" sz="2800" dirty="0">
-                <a:solidFill>
-                  <a:schemeClr val="bg1"/>
-                </a:solidFill>
-              </a:rPr>
-              <a:t>Pre-processing and Manual Feature Extraction was the key</a:t>
-            </a:r>
-          </a:p>
-          <a:p>
-            <a:endParaRPr lang="en-US" sz="2800" dirty="0">
-              <a:solidFill>
-                <a:schemeClr val="bg1"/>
-              </a:solidFill>
-            </a:endParaRPr>
-          </a:p>
-          <a:p>
-            <a:endParaRPr lang="en-US" sz="2800" dirty="0"/>
-          </a:p>
-        </p:txBody>
-      </p:sp>
-    </p:spTree>
-    <p:extLst>
-      <p:ext uri="{BB962C8B-B14F-4D97-AF65-F5344CB8AC3E}">
-        <p14:creationId xmlns:p14="http://schemas.microsoft.com/office/powerpoint/2010/main" val="1678848181"/>
-      </p:ext>
-    </p:extLst>
-  </p:cSld>
-  <p:clrMapOvr>
-    <a:masterClrMapping/>
-  </p:clrMapOvr>
+  <p:timing>
+    <p:tnLst>
+      <p:par>
+        <p:cTn id="1" dur="indefinite" restart="never" nodeType="tmRoot"/>
+      </p:par>
+    </p:tnLst>
+  </p:timing>
 </p:sld>
 </file>
 

</xml_diff>

<commit_message>
modified presentation bullet points
</commit_message>
<xml_diff>
--- a/Presentation.pptx
+++ b/Presentation.pptx
@@ -206,7 +206,7 @@
           <a:p>
             <a:fld id="{0B5FF9F3-B8F7-44D8-B55E-59E955E4F250}" type="datetimeFigureOut">
               <a:rPr lang="en-GB" smtClean="0"/>
-              <a:t>06/05/2016</a:t>
+              <a:t>08/05/2016</a:t>
             </a:fld>
             <a:endParaRPr lang="en-GB"/>
           </a:p>
@@ -2116,7 +2116,7 @@
           <a:p>
             <a:fld id="{BDDAFA7A-6445-4002-8C74-4055B96B083F}" type="datetimeFigureOut">
               <a:rPr lang="en-US" smtClean="0"/>
-              <a:t>5/6/2016</a:t>
+              <a:t>5/8/2016</a:t>
             </a:fld>
             <a:endParaRPr lang="en-US"/>
           </a:p>
@@ -2407,7 +2407,7 @@
           <a:p>
             <a:fld id="{BDDAFA7A-6445-4002-8C74-4055B96B083F}" type="datetimeFigureOut">
               <a:rPr lang="en-US" smtClean="0"/>
-              <a:t>5/6/2016</a:t>
+              <a:t>5/8/2016</a:t>
             </a:fld>
             <a:endParaRPr lang="en-US"/>
           </a:p>
@@ -2666,7 +2666,7 @@
           <a:p>
             <a:fld id="{BDDAFA7A-6445-4002-8C74-4055B96B083F}" type="datetimeFigureOut">
               <a:rPr lang="en-US" smtClean="0"/>
-              <a:t>5/6/2016</a:t>
+              <a:t>5/8/2016</a:t>
             </a:fld>
             <a:endParaRPr lang="en-US"/>
           </a:p>
@@ -3135,7 +3135,7 @@
           <a:p>
             <a:fld id="{BDDAFA7A-6445-4002-8C74-4055B96B083F}" type="datetimeFigureOut">
               <a:rPr lang="en-US" smtClean="0"/>
-              <a:t>5/6/2016</a:t>
+              <a:t>5/8/2016</a:t>
             </a:fld>
             <a:endParaRPr lang="en-US"/>
           </a:p>
@@ -3315,7 +3315,7 @@
           <a:p>
             <a:fld id="{BDDAFA7A-6445-4002-8C74-4055B96B083F}" type="datetimeFigureOut">
               <a:rPr lang="en-US" smtClean="0"/>
-              <a:t>5/6/2016</a:t>
+              <a:t>5/8/2016</a:t>
             </a:fld>
             <a:endParaRPr lang="en-US"/>
           </a:p>
@@ -3891,7 +3891,7 @@
           <a:p>
             <a:fld id="{BDDAFA7A-6445-4002-8C74-4055B96B083F}" type="datetimeFigureOut">
               <a:rPr lang="en-US" smtClean="0"/>
-              <a:t>5/6/2016</a:t>
+              <a:t>5/8/2016</a:t>
             </a:fld>
             <a:endParaRPr lang="en-US"/>
           </a:p>
@@ -4223,7 +4223,7 @@
           <a:p>
             <a:fld id="{BDDAFA7A-6445-4002-8C74-4055B96B083F}" type="datetimeFigureOut">
               <a:rPr lang="en-US" smtClean="0"/>
-              <a:t>5/6/2016</a:t>
+              <a:t>5/8/2016</a:t>
             </a:fld>
             <a:endParaRPr lang="en-US"/>
           </a:p>
@@ -4398,7 +4398,7 @@
           <a:p>
             <a:fld id="{BDDAFA7A-6445-4002-8C74-4055B96B083F}" type="datetimeFigureOut">
               <a:rPr lang="en-US" smtClean="0"/>
-              <a:t>5/6/2016</a:t>
+              <a:t>5/8/2016</a:t>
             </a:fld>
             <a:endParaRPr lang="en-US"/>
           </a:p>
@@ -4578,7 +4578,7 @@
           <a:p>
             <a:fld id="{BDDAFA7A-6445-4002-8C74-4055B96B083F}" type="datetimeFigureOut">
               <a:rPr lang="en-US" smtClean="0"/>
-              <a:t>5/6/2016</a:t>
+              <a:t>5/8/2016</a:t>
             </a:fld>
             <a:endParaRPr lang="en-US"/>
           </a:p>
@@ -4758,7 +4758,7 @@
           <a:p>
             <a:fld id="{BDDAFA7A-6445-4002-8C74-4055B96B083F}" type="datetimeFigureOut">
               <a:rPr lang="en-US" smtClean="0"/>
-              <a:t>5/6/2016</a:t>
+              <a:t>5/8/2016</a:t>
             </a:fld>
             <a:endParaRPr lang="en-US"/>
           </a:p>
@@ -5015,7 +5015,7 @@
           <a:p>
             <a:fld id="{BDDAFA7A-6445-4002-8C74-4055B96B083F}" type="datetimeFigureOut">
               <a:rPr lang="en-US" smtClean="0"/>
-              <a:t>5/6/2016</a:t>
+              <a:t>5/8/2016</a:t>
             </a:fld>
             <a:endParaRPr lang="en-US"/>
           </a:p>
@@ -5307,7 +5307,7 @@
           <a:p>
             <a:fld id="{BDDAFA7A-6445-4002-8C74-4055B96B083F}" type="datetimeFigureOut">
               <a:rPr lang="en-US" smtClean="0"/>
-              <a:t>5/6/2016</a:t>
+              <a:t>5/8/2016</a:t>
             </a:fld>
             <a:endParaRPr lang="en-US"/>
           </a:p>
@@ -5737,7 +5737,7 @@
           <a:p>
             <a:fld id="{BDDAFA7A-6445-4002-8C74-4055B96B083F}" type="datetimeFigureOut">
               <a:rPr lang="en-US" smtClean="0"/>
-              <a:t>5/6/2016</a:t>
+              <a:t>5/8/2016</a:t>
             </a:fld>
             <a:endParaRPr lang="en-US"/>
           </a:p>
@@ -5855,7 +5855,7 @@
           <a:p>
             <a:fld id="{BDDAFA7A-6445-4002-8C74-4055B96B083F}" type="datetimeFigureOut">
               <a:rPr lang="en-US" smtClean="0"/>
-              <a:t>5/6/2016</a:t>
+              <a:t>5/8/2016</a:t>
             </a:fld>
             <a:endParaRPr lang="en-US"/>
           </a:p>
@@ -5950,7 +5950,7 @@
           <a:p>
             <a:fld id="{BDDAFA7A-6445-4002-8C74-4055B96B083F}" type="datetimeFigureOut">
               <a:rPr lang="en-US" smtClean="0"/>
-              <a:t>5/6/2016</a:t>
+              <a:t>5/8/2016</a:t>
             </a:fld>
             <a:endParaRPr lang="en-US"/>
           </a:p>
@@ -6233,7 +6233,7 @@
           <a:p>
             <a:fld id="{BDDAFA7A-6445-4002-8C74-4055B96B083F}" type="datetimeFigureOut">
               <a:rPr lang="en-US" smtClean="0"/>
-              <a:t>5/6/2016</a:t>
+              <a:t>5/8/2016</a:t>
             </a:fld>
             <a:endParaRPr lang="en-US"/>
           </a:p>
@@ -6524,7 +6524,7 @@
           <a:p>
             <a:fld id="{BDDAFA7A-6445-4002-8C74-4055B96B083F}" type="datetimeFigureOut">
               <a:rPr lang="en-US" smtClean="0"/>
-              <a:t>5/6/2016</a:t>
+              <a:t>5/8/2016</a:t>
             </a:fld>
             <a:endParaRPr lang="en-US"/>
           </a:p>
@@ -6755,7 +6755,7 @@
           <a:p>
             <a:fld id="{BDDAFA7A-6445-4002-8C74-4055B96B083F}" type="datetimeFigureOut">
               <a:rPr lang="en-US" smtClean="0"/>
-              <a:t>5/6/2016</a:t>
+              <a:t>5/8/2016</a:t>
             </a:fld>
             <a:endParaRPr lang="en-US"/>
           </a:p>
@@ -7854,15 +7854,7 @@
                   <a:schemeClr val="bg1"/>
                 </a:solidFill>
               </a:rPr>
-              <a:t>Preprocessing and </a:t>
-            </a:r>
-            <a:r>
-              <a:rPr lang="en-US" sz="3200" dirty="0" smtClean="0">
-                <a:solidFill>
-                  <a:schemeClr val="bg1"/>
-                </a:solidFill>
-              </a:rPr>
-              <a:t>feature extraction key to success</a:t>
+              <a:t>Preprocessing and feature extraction key to success</a:t>
             </a:r>
             <a:endParaRPr lang="en-US" sz="3200" dirty="0"/>
           </a:p>
@@ -8315,28 +8307,46 @@
                   <a:schemeClr val="bg1"/>
                 </a:solidFill>
               </a:rPr>
-              <a:t>Search Queries</a:t>
-            </a:r>
-          </a:p>
-          <a:p>
-            <a:r>
-              <a:rPr lang="en-GB" sz="3600" dirty="0">
+              <a:t>Search </a:t>
+            </a:r>
+            <a:r>
+              <a:rPr lang="en-GB" sz="3600" dirty="0" smtClean="0">
                 <a:solidFill>
                   <a:schemeClr val="bg1"/>
                 </a:solidFill>
               </a:rPr>
-              <a:t>Search Results</a:t>
-            </a:r>
-          </a:p>
-          <a:p>
-            <a:r>
-              <a:rPr lang="en-GB" sz="3600" dirty="0">
+              <a:t>Queries</a:t>
+            </a:r>
+          </a:p>
+          <a:p>
+            <a:r>
+              <a:rPr lang="en-GB" sz="3600" dirty="0" smtClean="0">
                 <a:solidFill>
                   <a:schemeClr val="bg1"/>
                 </a:solidFill>
               </a:rPr>
-              <a:t>Scores</a:t>
-            </a:r>
+              <a:t>Relevance Scores</a:t>
+            </a:r>
+            <a:endParaRPr lang="en-GB" sz="3600" dirty="0">
+              <a:solidFill>
+                <a:schemeClr val="bg1"/>
+              </a:solidFill>
+            </a:endParaRPr>
+          </a:p>
+          <a:p>
+            <a:r>
+              <a:rPr lang="en-US" sz="3600" dirty="0" smtClean="0">
+                <a:solidFill>
+                  <a:schemeClr val="bg1"/>
+                </a:solidFill>
+              </a:rPr>
+              <a:t>Product Information</a:t>
+            </a:r>
+            <a:endParaRPr lang="en-GB" sz="3600" dirty="0">
+              <a:solidFill>
+                <a:schemeClr val="bg1"/>
+              </a:solidFill>
+            </a:endParaRPr>
           </a:p>
           <a:p>
             <a:pPr marL="0" indent="0">
@@ -8468,28 +8478,55 @@
                   <a:schemeClr val="bg1"/>
                 </a:solidFill>
               </a:rPr>
-              <a:t>Punctuation Errors</a:t>
-            </a:r>
-          </a:p>
-          <a:p>
+              <a:t>Punctuation/ </a:t>
+            </a:r>
+            <a:r>
+              <a:rPr lang="en-US" sz="2800" dirty="0" smtClean="0">
+                <a:solidFill>
+                  <a:schemeClr val="bg1"/>
+                </a:solidFill>
+              </a:rPr>
+              <a:t>Typographical </a:t>
+            </a:r>
             <a:r>
               <a:rPr lang="en-US" sz="2800" dirty="0">
                 <a:solidFill>
                   <a:schemeClr val="bg1"/>
                 </a:solidFill>
               </a:rPr>
-              <a:t>Unit of Measurement Errors</a:t>
-            </a:r>
-          </a:p>
-          <a:p>
+              <a:t>Errors</a:t>
+            </a:r>
+          </a:p>
+          <a:p>
+            <a:r>
+              <a:rPr lang="en-US" sz="2800" dirty="0" smtClean="0">
+                <a:solidFill>
+                  <a:schemeClr val="bg1"/>
+                </a:solidFill>
+              </a:rPr>
+              <a:t>Units </a:t>
+            </a:r>
             <a:r>
               <a:rPr lang="en-US" sz="2800" dirty="0">
                 <a:solidFill>
                   <a:schemeClr val="bg1"/>
                 </a:solidFill>
               </a:rPr>
-              <a:t>Typographical Errors</a:t>
-            </a:r>
+              <a:t>of Measurement </a:t>
+            </a:r>
+            <a:r>
+              <a:rPr lang="en-US" sz="2800" dirty="0" smtClean="0">
+                <a:solidFill>
+                  <a:schemeClr val="bg1"/>
+                </a:solidFill>
+              </a:rPr>
+              <a:t>handling</a:t>
+            </a:r>
+            <a:endParaRPr lang="en-US" sz="2800" dirty="0">
+              <a:solidFill>
+                <a:schemeClr val="bg1"/>
+              </a:solidFill>
+            </a:endParaRPr>
           </a:p>
           <a:p>
             <a:r>
@@ -8678,12 +8715,20 @@
           </a:p>
           <a:p>
             <a:r>
+              <a:rPr lang="en-US" sz="3600" dirty="0" smtClean="0">
+                <a:solidFill>
+                  <a:schemeClr val="bg1"/>
+                </a:solidFill>
+              </a:rPr>
+              <a:t>Special </a:t>
+            </a:r>
+            <a:r>
               <a:rPr lang="en-US" sz="3600" dirty="0">
                 <a:solidFill>
                   <a:schemeClr val="bg1"/>
                 </a:solidFill>
               </a:rPr>
-              <a:t>Simple word counts as features</a:t>
+              <a:t>word counts as features</a:t>
             </a:r>
           </a:p>
           <a:p>
@@ -9036,28 +9081,28 @@
                 <a:gridCol w="2650380">
                   <a:extLst>
                     <a:ext uri="{9D8B030D-6E8A-4147-A177-3AD203B41FA5}">
-                      <a16:colId xmlns:a16="http://schemas.microsoft.com/office/drawing/2014/main" xmlns="" val="20000"/>
+                      <a16:colId xmlns="" xmlns:a16="http://schemas.microsoft.com/office/drawing/2014/main" val="20000"/>
                     </a:ext>
                   </a:extLst>
                 </a:gridCol>
                 <a:gridCol w="2650380">
                   <a:extLst>
                     <a:ext uri="{9D8B030D-6E8A-4147-A177-3AD203B41FA5}">
-                      <a16:colId xmlns:a16="http://schemas.microsoft.com/office/drawing/2014/main" xmlns="" val="1446668731"/>
+                      <a16:colId xmlns="" xmlns:a16="http://schemas.microsoft.com/office/drawing/2014/main" val="1446668731"/>
                     </a:ext>
                   </a:extLst>
                 </a:gridCol>
                 <a:gridCol w="2650380">
                   <a:extLst>
                     <a:ext uri="{9D8B030D-6E8A-4147-A177-3AD203B41FA5}">
-                      <a16:colId xmlns:a16="http://schemas.microsoft.com/office/drawing/2014/main" xmlns="" val="3945954696"/>
+                      <a16:colId xmlns="" xmlns:a16="http://schemas.microsoft.com/office/drawing/2014/main" val="3945954696"/>
                     </a:ext>
                   </a:extLst>
                 </a:gridCol>
                 <a:gridCol w="3094755">
                   <a:extLst>
                     <a:ext uri="{9D8B030D-6E8A-4147-A177-3AD203B41FA5}">
-                      <a16:colId xmlns:a16="http://schemas.microsoft.com/office/drawing/2014/main" xmlns="" val="20001"/>
+                      <a16:colId xmlns="" xmlns:a16="http://schemas.microsoft.com/office/drawing/2014/main" val="20001"/>
                     </a:ext>
                   </a:extLst>
                 </a:gridCol>
@@ -9306,7 +9351,7 @@
                 </a:tc>
                 <a:extLst>
                   <a:ext uri="{0D108BD9-81ED-4DB2-BD59-A6C34878D82A}">
-                    <a16:rowId xmlns:a16="http://schemas.microsoft.com/office/drawing/2014/main" xmlns="" val="10000"/>
+                    <a16:rowId xmlns="" xmlns:a16="http://schemas.microsoft.com/office/drawing/2014/main" val="10000"/>
                   </a:ext>
                 </a:extLst>
               </a:tr>
@@ -9541,7 +9586,7 @@
                 </a:tc>
                 <a:extLst>
                   <a:ext uri="{0D108BD9-81ED-4DB2-BD59-A6C34878D82A}">
-                    <a16:rowId xmlns:a16="http://schemas.microsoft.com/office/drawing/2014/main" xmlns="" val="10001"/>
+                    <a16:rowId xmlns="" xmlns:a16="http://schemas.microsoft.com/office/drawing/2014/main" val="10001"/>
                   </a:ext>
                 </a:extLst>
               </a:tr>
@@ -9793,7 +9838,7 @@
                 </a:tc>
                 <a:extLst>
                   <a:ext uri="{0D108BD9-81ED-4DB2-BD59-A6C34878D82A}">
-                    <a16:rowId xmlns:a16="http://schemas.microsoft.com/office/drawing/2014/main" xmlns="" val="10002"/>
+                    <a16:rowId xmlns="" xmlns:a16="http://schemas.microsoft.com/office/drawing/2014/main" val="10002"/>
                   </a:ext>
                 </a:extLst>
               </a:tr>
@@ -10028,7 +10073,7 @@
                 </a:tc>
                 <a:extLst>
                   <a:ext uri="{0D108BD9-81ED-4DB2-BD59-A6C34878D82A}">
-                    <a16:rowId xmlns:a16="http://schemas.microsoft.com/office/drawing/2014/main" xmlns="" val="10003"/>
+                    <a16:rowId xmlns="" xmlns:a16="http://schemas.microsoft.com/office/drawing/2014/main" val="10003"/>
                   </a:ext>
                 </a:extLst>
               </a:tr>

</xml_diff>